<commit_message>
Docs: final presentation update
</commit_message>
<xml_diff>
--- a/docs/final_presentation.pptx
+++ b/docs/final_presentation.pptx
@@ -5317,7 +5317,7 @@
           <a:graphicData uri="http://schemas.openxmlformats.org/presentationml/2006/ole">
             <mc:AlternateContent xmlns:mc="http://schemas.openxmlformats.org/markup-compatibility/2006">
               <mc:Choice xmlns:v="urn:schemas-microsoft-com:vml" Requires="v">
-                <p:oleObj spid="_x0000_s5128" name="Visio" r:id="rId7" imgW="6225341" imgH="1409637" progId="Visio.Drawing.15">
+                <p:oleObj spid="_x0000_s5129" name="Visio" r:id="rId7" imgW="6225341" imgH="1409637" progId="Visio.Drawing.15">
                   <p:embed/>
                 </p:oleObj>
               </mc:Choice>
@@ -5709,34 +5709,6 @@
                 <a:schemeClr val="accent2"/>
               </a:solidFill>
             </a:endParaRPr>
-          </a:p>
-        </p:txBody>
-      </p:sp>
-      <p:sp>
-        <p:nvSpPr>
-          <p:cNvPr id="2" name="Slide Number Placeholder 1"/>
-          <p:cNvSpPr>
-            <a:spLocks noGrp="1"/>
-          </p:cNvSpPr>
-          <p:nvPr>
-            <p:ph type="sldNum" sz="quarter" idx="12"/>
-          </p:nvPr>
-        </p:nvSpPr>
-        <p:spPr/>
-        <p:txBody>
-          <a:bodyPr/>
-          <a:lstStyle/>
-          <a:p>
-            <a:fld id="{D57F1E4F-1CFF-5643-939E-217C01CDF565}" type="slidenum">
-              <a:rPr lang="en-US" smtClean="0"/>
-              <a:pPr/>
-              <a:t>3</a:t>
-            </a:fld>
-            <a:r>
-              <a:rPr lang="en-US"/>
-              <a:t> of 11</a:t>
-            </a:r>
-            <a:endParaRPr lang="en-US" dirty="0"/>
           </a:p>
         </p:txBody>
       </p:sp>
@@ -7466,7 +7438,7 @@
           <a:graphicData uri="http://schemas.openxmlformats.org/presentationml/2006/ole">
             <mc:AlternateContent xmlns:mc="http://schemas.openxmlformats.org/markup-compatibility/2006">
               <mc:Choice xmlns:v="urn:schemas-microsoft-com:vml" Requires="v">
-                <p:oleObj spid="_x0000_s1038" name="Visio" r:id="rId3" imgW="6225341" imgH="1409637" progId="Visio.Drawing.15">
+                <p:oleObj spid="_x0000_s1039" name="Visio" r:id="rId3" imgW="6225341" imgH="1409637" progId="Visio.Drawing.15">
                   <p:embed/>
                 </p:oleObj>
               </mc:Choice>

</xml_diff>